<commit_message>
add starsbars-S03-lec20, minor edit slides11f
</commit_message>
<xml_diff>
--- a/fall11/slidesF11/slides11f.pptx
+++ b/fall11/slidesF11/slides11f.pptx
@@ -6409,7 +6409,7 @@
           <a:graphicData uri="http://schemas.openxmlformats.org/presentationml/2006/ole">
             <mc:AlternateContent xmlns:mc="http://schemas.openxmlformats.org/markup-compatibility/2006">
               <mc:Choice xmlns:v="urn:schemas-microsoft-com:vml" Requires="v">
-                <p:oleObj spid="_x0000_s137223" name="Equation" r:id="rId4" imgW="1257120" imgH="457200" progId="Equation.DSMT4">
+                <p:oleObj spid="_x0000_s137225" name="Equation" r:id="rId4" imgW="1257120" imgH="457200" progId="Equation.DSMT4">
                   <p:embed/>
                 </p:oleObj>
               </mc:Choice>
@@ -13345,7 +13345,7 @@
           <a:graphicData uri="http://schemas.openxmlformats.org/presentationml/2006/ole">
             <mc:AlternateContent xmlns:mc="http://schemas.openxmlformats.org/markup-compatibility/2006">
               <mc:Choice xmlns:v="urn:schemas-microsoft-com:vml" Requires="v">
-                <p:oleObj spid="_x0000_s153607" name="Equation" r:id="rId9" imgW="508000" imgH="406400" progId="Equation.DSMT4">
+                <p:oleObj spid="_x0000_s153609" name="Equation" r:id="rId9" imgW="508000" imgH="406400" progId="Equation.DSMT4">
                   <p:embed/>
                 </p:oleObj>
               </mc:Choice>
@@ -14501,7 +14501,7 @@
           <a:graphicData uri="http://schemas.openxmlformats.org/presentationml/2006/ole">
             <mc:AlternateContent xmlns:mc="http://schemas.openxmlformats.org/markup-compatibility/2006">
               <mc:Choice xmlns:v="urn:schemas-microsoft-com:vml" Requires="v">
-                <p:oleObj spid="_x0000_s155658" name="Equation" r:id="rId4" imgW="1002960" imgH="406080" progId="Equation.DSMT4">
+                <p:oleObj spid="_x0000_s155661" name="Equation" r:id="rId4" imgW="1002960" imgH="406080" progId="Equation.DSMT4">
                   <p:embed/>
                 </p:oleObj>
               </mc:Choice>
@@ -14630,7 +14630,7 @@
           <a:graphicData uri="http://schemas.openxmlformats.org/presentationml/2006/ole">
             <mc:AlternateContent xmlns:mc="http://schemas.openxmlformats.org/markup-compatibility/2006">
               <mc:Choice xmlns:v="urn:schemas-microsoft-com:vml" Requires="v">
-                <p:oleObj spid="_x0000_s155659" name="Equation" r:id="rId6" imgW="1104840" imgH="457200" progId="Equation.DSMT4">
+                <p:oleObj spid="_x0000_s155662" name="Equation" r:id="rId6" imgW="1104840" imgH="457200" progId="Equation.DSMT4">
                   <p:embed/>
                 </p:oleObj>
               </mc:Choice>
@@ -15429,7 +15429,7 @@
           <a:graphicData uri="http://schemas.openxmlformats.org/presentationml/2006/ole">
             <mc:AlternateContent xmlns:mc="http://schemas.openxmlformats.org/markup-compatibility/2006">
               <mc:Choice xmlns:v="urn:schemas-microsoft-com:vml" Requires="v">
-                <p:oleObj spid="_x0000_s157703" name="Equation" r:id="rId4" imgW="1028700" imgH="482600" progId="Equation.DSMT4">
+                <p:oleObj spid="_x0000_s157705" name="Equation" r:id="rId4" imgW="1028700" imgH="482600" progId="Equation.DSMT4">
                   <p:embed/>
                 </p:oleObj>
               </mc:Choice>
@@ -15959,13 +15959,13 @@
   <p:clrMapOvr>
     <a:masterClrMapping/>
   </p:clrMapOvr>
-  <mc:AlternateContent xmlns:mc="http://schemas.openxmlformats.org/markup-compatibility/2006">
-    <mc:Choice xmlns:p14="http://schemas.microsoft.com/office/powerpoint/2010/main" Requires="p14">
+  <mc:AlternateContent xmlns:mc="http://schemas.openxmlformats.org/markup-compatibility/2006" xmlns:p14="http://schemas.microsoft.com/office/powerpoint/2010/main">
+    <mc:Choice Requires="p14">
       <p:transition spd="slow" p14:dur="1200">
         <p:dissolve/>
       </p:transition>
     </mc:Choice>
-    <mc:Fallback>
+    <mc:Fallback xmlns="">
       <p:transition xmlns:p14="http://schemas.microsoft.com/office/powerpoint/2010/main" spd="slow">
         <p:dissolve/>
       </p:transition>
@@ -16590,7 +16590,7 @@
           <a:graphicData uri="http://schemas.openxmlformats.org/presentationml/2006/ole">
             <mc:AlternateContent xmlns:mc="http://schemas.openxmlformats.org/markup-compatibility/2006">
               <mc:Choice xmlns:v="urn:schemas-microsoft-com:vml" Requires="v">
-                <p:oleObj spid="_x0000_s1031" name="Equation" r:id="rId4" imgW="1790640" imgH="228600" progId="Equation.DSMT4">
+                <p:oleObj spid="_x0000_s1033" name="Equation" r:id="rId4" imgW="1790640" imgH="228600" progId="Equation.DSMT4">
                   <p:embed/>
                 </p:oleObj>
               </mc:Choice>
@@ -17400,7 +17400,7 @@
             <a:graphicData uri="http://schemas.openxmlformats.org/presentationml/2006/ole">
               <mc:AlternateContent xmlns:mc="http://schemas.openxmlformats.org/markup-compatibility/2006">
                 <mc:Choice xmlns:v="urn:schemas-microsoft-com:vml" Requires="v">
-                  <p:oleObj spid="_x0000_s2061" name="Equation" r:id="rId4" imgW="609480" imgH="228600" progId="Equation.DSMT4">
+                  <p:oleObj spid="_x0000_s2065" name="Equation" r:id="rId4" imgW="609480" imgH="228600" progId="Equation.DSMT4">
                     <p:embed/>
                   </p:oleObj>
                 </mc:Choice>
@@ -17519,7 +17519,7 @@
             <a:graphicData uri="http://schemas.openxmlformats.org/presentationml/2006/ole">
               <mc:AlternateContent xmlns:mc="http://schemas.openxmlformats.org/markup-compatibility/2006">
                 <mc:Choice xmlns:v="urn:schemas-microsoft-com:vml" Requires="v">
-                  <p:oleObj spid="_x0000_s2062" name="Equation" r:id="rId6" imgW="685800" imgH="228600" progId="Equation.DSMT4">
+                  <p:oleObj spid="_x0000_s2066" name="Equation" r:id="rId6" imgW="685800" imgH="228600" progId="Equation.DSMT4">
                     <p:embed/>
                   </p:oleObj>
                 </mc:Choice>
@@ -17635,7 +17635,7 @@
             <a:graphicData uri="http://schemas.openxmlformats.org/presentationml/2006/ole">
               <mc:AlternateContent xmlns:mc="http://schemas.openxmlformats.org/markup-compatibility/2006">
                 <mc:Choice xmlns:v="urn:schemas-microsoft-com:vml" Requires="v">
-                  <p:oleObj spid="_x0000_s2063" name="Equation" r:id="rId8" imgW="774360" imgH="177480" progId="Equation.DSMT4">
+                  <p:oleObj spid="_x0000_s2067" name="Equation" r:id="rId8" imgW="774360" imgH="177480" progId="Equation.DSMT4">
                     <p:embed/>
                   </p:oleObj>
                 </mc:Choice>
@@ -18092,7 +18092,7 @@
           <a:graphicData uri="http://schemas.openxmlformats.org/presentationml/2006/ole">
             <mc:AlternateContent xmlns:mc="http://schemas.openxmlformats.org/markup-compatibility/2006">
               <mc:Choice xmlns:v="urn:schemas-microsoft-com:vml" Requires="v">
-                <p:oleObj spid="_x0000_s3085" name="Equation" r:id="rId4" imgW="901440" imgH="406080" progId="Equation.DSMT4">
+                <p:oleObj spid="_x0000_s3089" name="Equation" r:id="rId4" imgW="901440" imgH="406080" progId="Equation.DSMT4">
                   <p:embed/>
                 </p:oleObj>
               </mc:Choice>
@@ -18162,7 +18162,7 @@
           <a:graphicData uri="http://schemas.openxmlformats.org/presentationml/2006/ole">
             <mc:AlternateContent xmlns:mc="http://schemas.openxmlformats.org/markup-compatibility/2006">
               <mc:Choice xmlns:v="urn:schemas-microsoft-com:vml" Requires="v">
-                <p:oleObj spid="_x0000_s3086" name="Equation" r:id="rId6" imgW="1015920" imgH="558720" progId="Equation.DSMT4">
+                <p:oleObj spid="_x0000_s3090" name="Equation" r:id="rId6" imgW="1015920" imgH="558720" progId="Equation.DSMT4">
                   <p:embed/>
                 </p:oleObj>
               </mc:Choice>
@@ -18232,7 +18232,7 @@
           <a:graphicData uri="http://schemas.openxmlformats.org/presentationml/2006/ole">
             <mc:AlternateContent xmlns:mc="http://schemas.openxmlformats.org/markup-compatibility/2006">
               <mc:Choice xmlns:v="urn:schemas-microsoft-com:vml" Requires="v">
-                <p:oleObj spid="_x0000_s3087" name="Equation" r:id="rId8" imgW="1663560" imgH="482400" progId="Equation.DSMT4">
+                <p:oleObj spid="_x0000_s3091" name="Equation" r:id="rId8" imgW="1663560" imgH="482400" progId="Equation.DSMT4">
                   <p:embed/>
                 </p:oleObj>
               </mc:Choice>
@@ -18612,7 +18612,7 @@
           <a:graphicData uri="http://schemas.openxmlformats.org/presentationml/2006/ole">
             <mc:AlternateContent xmlns:mc="http://schemas.openxmlformats.org/markup-compatibility/2006">
               <mc:Choice xmlns:v="urn:schemas-microsoft-com:vml" Requires="v">
-                <p:oleObj spid="_x0000_s4109" name="Equation" r:id="rId4" imgW="1726920" imgH="799920" progId="Equation.DSMT4">
+                <p:oleObj spid="_x0000_s4113" name="Equation" r:id="rId4" imgW="1726920" imgH="799920" progId="Equation.DSMT4">
                   <p:embed/>
                 </p:oleObj>
               </mc:Choice>
@@ -18682,7 +18682,7 @@
           <a:graphicData uri="http://schemas.openxmlformats.org/presentationml/2006/ole">
             <mc:AlternateContent xmlns:mc="http://schemas.openxmlformats.org/markup-compatibility/2006">
               <mc:Choice xmlns:v="urn:schemas-microsoft-com:vml" Requires="v">
-                <p:oleObj spid="_x0000_s4110" name="Equation" r:id="rId6" imgW="1587240" imgH="279360" progId="Equation.DSMT4">
+                <p:oleObj spid="_x0000_s4114" name="Equation" r:id="rId6" imgW="1587240" imgH="279360" progId="Equation.DSMT4">
                   <p:embed/>
                 </p:oleObj>
               </mc:Choice>
@@ -18817,7 +18817,7 @@
             <a:graphicData uri="http://schemas.openxmlformats.org/presentationml/2006/ole">
               <mc:AlternateContent xmlns:mc="http://schemas.openxmlformats.org/markup-compatibility/2006">
                 <mc:Choice xmlns:v="urn:schemas-microsoft-com:vml" Requires="v">
-                  <p:oleObj spid="_x0000_s4111" name="Equation" r:id="rId8" imgW="927000" imgH="279360" progId="Equation.DSMT4">
+                  <p:oleObj spid="_x0000_s4115" name="Equation" r:id="rId8" imgW="927000" imgH="279360" progId="Equation.DSMT4">
                     <p:embed/>
                   </p:oleObj>
                 </mc:Choice>
@@ -19798,7 +19798,7 @@
           <a:graphicData uri="http://schemas.openxmlformats.org/presentationml/2006/ole">
             <mc:AlternateContent xmlns:mc="http://schemas.openxmlformats.org/markup-compatibility/2006">
               <mc:Choice xmlns:v="urn:schemas-microsoft-com:vml" Requires="v">
-                <p:oleObj spid="_x0000_s5130" name="Equation" r:id="rId4" imgW="1269720" imgH="253800" progId="Equation.DSMT4">
+                <p:oleObj spid="_x0000_s5133" name="Equation" r:id="rId4" imgW="1269720" imgH="253800" progId="Equation.DSMT4">
                   <p:embed/>
                 </p:oleObj>
               </mc:Choice>
@@ -19874,7 +19874,7 @@
           <a:graphicData uri="http://schemas.openxmlformats.org/presentationml/2006/ole">
             <mc:AlternateContent xmlns:mc="http://schemas.openxmlformats.org/markup-compatibility/2006">
               <mc:Choice xmlns:v="urn:schemas-microsoft-com:vml" Requires="v">
-                <p:oleObj spid="_x0000_s5131" name="Equation" r:id="rId6" imgW="1447800" imgH="482600" progId="Equation.3">
+                <p:oleObj spid="_x0000_s5134" name="Equation" r:id="rId6" imgW="1447800" imgH="482600" progId="Equation.3">
                   <p:embed/>
                 </p:oleObj>
               </mc:Choice>
@@ -20071,7 +20071,7 @@
 </file>
 
 <file path=ppt/slides/slide3.xml><?xml version="1.0" encoding="utf-8"?>
-<p:sld xmlns:a="http://schemas.openxmlformats.org/drawingml/2006/main" xmlns:r="http://schemas.openxmlformats.org/officeDocument/2006/relationships" xmlns:p="http://schemas.openxmlformats.org/presentationml/2006/main">
+<p:sld xmlns:a="http://schemas.openxmlformats.org/drawingml/2006/main" xmlns:r="http://schemas.openxmlformats.org/officeDocument/2006/relationships" xmlns:p="http://schemas.openxmlformats.org/presentationml/2006/main" show="0">
   <p:cSld>
     <p:spTree>
       <p:nvGrpSpPr>
@@ -20233,7 +20233,7 @@
           <a:graphicData uri="http://schemas.openxmlformats.org/presentationml/2006/ole">
             <mc:AlternateContent xmlns:mc="http://schemas.openxmlformats.org/markup-compatibility/2006">
               <mc:Choice xmlns:v="urn:schemas-microsoft-com:vml" Requires="v">
-                <p:oleObj spid="_x0000_s198666" name="Equation" r:id="rId4" imgW="622300" imgH="495300" progId="Equation.DSMT4">
+                <p:oleObj spid="_x0000_s198669" name="Equation" r:id="rId4" imgW="622300" imgH="495300" progId="Equation.DSMT4">
                   <p:embed/>
                 </p:oleObj>
               </mc:Choice>
@@ -20303,7 +20303,7 @@
           <a:graphicData uri="http://schemas.openxmlformats.org/presentationml/2006/ole">
             <mc:AlternateContent xmlns:mc="http://schemas.openxmlformats.org/markup-compatibility/2006">
               <mc:Choice xmlns:v="urn:schemas-microsoft-com:vml" Requires="v">
-                <p:oleObj spid="_x0000_s198667" name="Equation" r:id="rId6" imgW="1358900" imgH="508000" progId="Equation.DSMT4">
+                <p:oleObj spid="_x0000_s198670" name="Equation" r:id="rId6" imgW="1358900" imgH="508000" progId="Equation.DSMT4">
                   <p:embed/>
                 </p:oleObj>
               </mc:Choice>
@@ -21515,7 +21515,7 @@
           <a:graphicData uri="http://schemas.openxmlformats.org/presentationml/2006/ole">
             <mc:AlternateContent xmlns:mc="http://schemas.openxmlformats.org/markup-compatibility/2006">
               <mc:Choice xmlns:v="urn:schemas-microsoft-com:vml" Requires="v">
-                <p:oleObj spid="_x0000_s29709" name="Equation" r:id="rId4" imgW="1816100" imgH="355600" progId="Equation.DSMT4">
+                <p:oleObj spid="_x0000_s29713" name="Equation" r:id="rId4" imgW="1816100" imgH="355600" progId="Equation.DSMT4">
                   <p:embed/>
                 </p:oleObj>
               </mc:Choice>
@@ -21585,7 +21585,7 @@
           <a:graphicData uri="http://schemas.openxmlformats.org/presentationml/2006/ole">
             <mc:AlternateContent xmlns:mc="http://schemas.openxmlformats.org/markup-compatibility/2006">
               <mc:Choice xmlns:v="urn:schemas-microsoft-com:vml" Requires="v">
-                <p:oleObj spid="_x0000_s29710" name="Equation" r:id="rId6" imgW="1905000" imgH="355600" progId="Equation.DSMT4">
+                <p:oleObj spid="_x0000_s29714" name="Equation" r:id="rId6" imgW="1905000" imgH="355600" progId="Equation.DSMT4">
                   <p:embed/>
                 </p:oleObj>
               </mc:Choice>
@@ -21655,7 +21655,7 @@
           <a:graphicData uri="http://schemas.openxmlformats.org/presentationml/2006/ole">
             <mc:AlternateContent xmlns:mc="http://schemas.openxmlformats.org/markup-compatibility/2006">
               <mc:Choice xmlns:v="urn:schemas-microsoft-com:vml" Requires="v">
-                <p:oleObj spid="_x0000_s29711" name="Equation" r:id="rId8" imgW="2552700" imgH="355600" progId="Equation.DSMT4">
+                <p:oleObj spid="_x0000_s29715" name="Equation" r:id="rId8" imgW="2552700" imgH="355600" progId="Equation.DSMT4">
                   <p:embed/>
                 </p:oleObj>
               </mc:Choice>
@@ -30863,7 +30863,18 @@
   <p:clrMapOvr>
     <a:masterClrMapping/>
   </p:clrMapOvr>
-  <p:transition xmlns:p14="http://schemas.microsoft.com/office/powerpoint/2010/main"/>
+  <mc:AlternateContent xmlns:mc="http://schemas.openxmlformats.org/markup-compatibility/2006">
+    <mc:Choice xmlns:p14="http://schemas.microsoft.com/office/powerpoint/2010/main" Requires="p14">
+      <p:transition spd="slow" p14:dur="800">
+        <p:fade thruBlk="1"/>
+      </p:transition>
+    </mc:Choice>
+    <mc:Fallback>
+      <p:transition xmlns:p14="http://schemas.microsoft.com/office/powerpoint/2010/main" spd="slow">
+        <p:fade thruBlk="1"/>
+      </p:transition>
+    </mc:Fallback>
+  </mc:AlternateContent>
   <p:timing>
     <p:tnLst>
       <p:par>
@@ -40955,7 +40966,7 @@
           <a:graphicData uri="http://schemas.openxmlformats.org/presentationml/2006/ole">
             <mc:AlternateContent xmlns:mc="http://schemas.openxmlformats.org/markup-compatibility/2006">
               <mc:Choice xmlns:v="urn:schemas-microsoft-com:vml" Requires="v">
-                <p:oleObj spid="_x0000_s133127" name="Equation" r:id="rId9" imgW="1397000" imgH="228600" progId="Equation.DSMT4">
+                <p:oleObj spid="_x0000_s133129" name="Equation" r:id="rId9" imgW="1397000" imgH="228600" progId="Equation.DSMT4">
                   <p:embed/>
                 </p:oleObj>
               </mc:Choice>

</xml_diff>